<commit_message>
March 6th before lunch
</commit_message>
<xml_diff>
--- a/Presentation material/treatment_guidelines_general.pptx
+++ b/Presentation material/treatment_guidelines_general.pptx
@@ -6238,7 +6238,15 @@
             </a:r>
             <a:r>
               <a:rPr lang="en-US" sz="2000" dirty="0"/>
-              <a:t>and write (without quotes) </a:t>
+              <a:t>and </a:t>
+            </a:r>
+            <a:r>
+              <a:rPr lang="en-US" sz="2000" dirty="0" smtClean="0"/>
+              <a:t>add (without </a:t>
+            </a:r>
+            <a:r>
+              <a:rPr lang="en-US" sz="2000" dirty="0"/>
+              <a:t>quotes) </a:t>
             </a:r>
             <a:r>
               <a:rPr lang="en-US" sz="2000" dirty="0" smtClean="0"/>
@@ -6425,7 +6433,15 @@
             </a:r>
             <a:r>
               <a:rPr lang="en-US" sz="2000" dirty="0"/>
-              <a:t>and write (without quotes) “NC APs and issues”. Press Next.</a:t>
+              <a:t>and </a:t>
+            </a:r>
+            <a:r>
+              <a:rPr lang="en-US" sz="2000" dirty="0" smtClean="0"/>
+              <a:t>add (without </a:t>
+            </a:r>
+            <a:r>
+              <a:rPr lang="en-US" sz="2000" dirty="0"/>
+              <a:t>quotes) “NC APs and issues”. Press Next.</a:t>
             </a:r>
           </a:p>
           <a:p>
@@ -6503,19 +6519,7 @@
           <a:p>
             <a:r>
               <a:rPr lang="en-US" dirty="0" smtClean="0"/>
-              <a:t>FILTER </a:t>
-            </a:r>
-            <a:r>
-              <a:rPr lang="en-US" dirty="0" smtClean="0"/>
-              <a:t>III</a:t>
-            </a:r>
-            <a:r>
-              <a:rPr lang="en-US" dirty="0" smtClean="0"/>
-              <a:t>: </a:t>
-            </a:r>
-            <a:r>
-              <a:rPr lang="en-US" dirty="0" smtClean="0"/>
-              <a:t>NC Aps/Issues</a:t>
+              <a:t>FILTER III: NC Aps/Issues</a:t>
             </a:r>
             <a:endParaRPr lang="en-US" dirty="0"/>
           </a:p>
@@ -6573,18 +6577,107 @@
           <a:bodyPr/>
           <a:lstStyle/>
           <a:p>
-            <a:r>
-              <a:rPr lang="en-US" dirty="0" smtClean="0"/>
-              <a:t>TODO (BU Radio Internal Communications Global Internal Communications, All workforce-Sweden-Goteborg-</a:t>
-            </a:r>
-            <a:r>
-              <a:rPr lang="en-US" dirty="0" err="1" smtClean="0"/>
-              <a:t>DynDL</a:t>
-            </a:r>
-            <a:r>
-              <a:rPr lang="en-US" dirty="0"/>
-              <a:t> (DDLAWSWGO@ex1.eemea.ericsson.se)).</a:t>
-            </a:r>
+            <a:pPr marL="457200" indent="-457200">
+              <a:buFont typeface="+mj-lt"/>
+              <a:buAutoNum type="arabicPeriod"/>
+            </a:pPr>
+            <a:r>
+              <a:rPr lang="en-US" sz="2000" dirty="0"/>
+              <a:t>Start creating a new blank rule for received messages (Rules &gt; Manage Rules &amp; Alerts &gt; New Rule).</a:t>
+            </a:r>
+          </a:p>
+          <a:p>
+            <a:pPr marL="457200" indent="-457200">
+              <a:buFont typeface="+mj-lt"/>
+              <a:buAutoNum type="arabicPeriod"/>
+            </a:pPr>
+            <a:r>
+              <a:rPr lang="en-US" sz="2000" dirty="0"/>
+              <a:t>In the first step of the wizard, mark </a:t>
+            </a:r>
+            <a:r>
+              <a:rPr lang="en-US" sz="2000" dirty="0" smtClean="0"/>
+              <a:t>“sent to people or public group”. </a:t>
+            </a:r>
+            <a:r>
+              <a:rPr lang="en-US" sz="2000" dirty="0"/>
+              <a:t>Click the highlighted text </a:t>
+            </a:r>
+            <a:r>
+              <a:rPr lang="en-US" sz="2000" b="1" u="sng" dirty="0" smtClean="0">
+                <a:solidFill>
+                  <a:schemeClr val="tx2">
+                    <a:lumMod val="75000"/>
+                    <a:lumOff val="25000"/>
+                  </a:schemeClr>
+                </a:solidFill>
+              </a:rPr>
+              <a:t>“people or public group”</a:t>
+            </a:r>
+            <a:r>
+              <a:rPr lang="en-US" sz="2000" b="1" u="sng" dirty="0" smtClean="0"/>
+              <a:t> </a:t>
+            </a:r>
+            <a:r>
+              <a:rPr lang="en-US" sz="2000" dirty="0"/>
+              <a:t>and add (without quotes) “bu.radio.internal.communications@ericsson.com; global.internal.communications@ericsson.com; DDLAWSWGO@ex1.eemea.ericsson.se”. Press Next.</a:t>
+            </a:r>
+          </a:p>
+          <a:p>
+            <a:pPr marL="457200" indent="-457200">
+              <a:buFont typeface="+mj-lt"/>
+              <a:buAutoNum type="arabicPeriod"/>
+            </a:pPr>
+            <a:r>
+              <a:rPr lang="en-US" sz="2000" dirty="0"/>
+              <a:t>Select “move it to the specified folder. Click the highlighted text </a:t>
+            </a:r>
+            <a:r>
+              <a:rPr lang="en-US" sz="2000" b="1" u="sng" dirty="0">
+                <a:solidFill>
+                  <a:schemeClr val="tx2">
+                    <a:lumMod val="75000"/>
+                    <a:lumOff val="25000"/>
+                  </a:schemeClr>
+                </a:solidFill>
+              </a:rPr>
+              <a:t>“specified”</a:t>
+            </a:r>
+            <a:r>
+              <a:rPr lang="en-US" sz="2000" dirty="0"/>
+              <a:t>, then select “EXP_DIST” and press Next. Then press Next again.</a:t>
+            </a:r>
+          </a:p>
+          <a:p>
+            <a:pPr marL="457200" indent="-457200">
+              <a:buFont typeface="+mj-lt"/>
+              <a:buAutoNum type="arabicPeriod"/>
+            </a:pPr>
+            <a:r>
+              <a:rPr lang="en-US" sz="2000" dirty="0"/>
+              <a:t>Set “</a:t>
+            </a:r>
+            <a:r>
+              <a:rPr lang="en-US" sz="2000" dirty="0" smtClean="0"/>
+              <a:t>EXP_RUL_04” </a:t>
+            </a:r>
+            <a:r>
+              <a:rPr lang="en-US" sz="2000" dirty="0"/>
+              <a:t>as rule name, and make sure that the only box marked is “Turn on this rule”. Press Finish.</a:t>
+            </a:r>
+          </a:p>
+          <a:p>
+            <a:pPr marL="457200" indent="-457200">
+              <a:buFont typeface="+mj-lt"/>
+              <a:buAutoNum type="arabicPeriod"/>
+            </a:pPr>
+            <a:r>
+              <a:rPr lang="en-US" sz="2000" dirty="0"/>
+              <a:t>Press Apply.</a:t>
+            </a:r>
+          </a:p>
+          <a:p>
+            <a:endParaRPr lang="en-US" sz="2000" dirty="0"/>
           </a:p>
         </p:txBody>
       </p:sp>
@@ -6605,19 +6698,15 @@
           <a:p>
             <a:r>
               <a:rPr lang="en-US" dirty="0" smtClean="0"/>
-              <a:t>FILTER </a:t>
-            </a:r>
-            <a:r>
-              <a:rPr lang="en-US" dirty="0" smtClean="0"/>
-              <a:t>IV</a:t>
-            </a:r>
-            <a:r>
-              <a:rPr lang="en-US" dirty="0" smtClean="0"/>
-              <a:t>: Int. </a:t>
+              <a:t>FILTER IV: Int. </a:t>
             </a:r>
             <a:r>
               <a:rPr lang="en-US" dirty="0" err="1" smtClean="0"/>
               <a:t>comm</a:t>
+            </a:r>
+            <a:r>
+              <a:rPr lang="en-US" dirty="0" smtClean="0"/>
+              <a:t> (I)</a:t>
             </a:r>
             <a:endParaRPr lang="en-US" dirty="0"/>
           </a:p>
@@ -6710,7 +6799,15 @@
             </a:r>
             <a:r>
               <a:rPr lang="en-US" sz="2000" dirty="0"/>
-              <a:t>and write (without quotes) </a:t>
+              <a:t>and </a:t>
+            </a:r>
+            <a:r>
+              <a:rPr lang="en-US" sz="2000" dirty="0" smtClean="0"/>
+              <a:t>add (without </a:t>
+            </a:r>
+            <a:r>
+              <a:rPr lang="en-US" sz="2000" dirty="0"/>
+              <a:t>quotes) </a:t>
             </a:r>
             <a:r>
               <a:rPr lang="en-US" sz="2000" dirty="0" smtClean="0"/>
@@ -6796,15 +6893,7 @@
           <a:p>
             <a:r>
               <a:rPr lang="en-US" dirty="0" smtClean="0"/>
-              <a:t>FILTER </a:t>
-            </a:r>
-            <a:r>
-              <a:rPr lang="en-US" dirty="0" smtClean="0"/>
-              <a:t>V: MOM CAT </a:t>
-            </a:r>
-            <a:r>
-              <a:rPr lang="en-US" dirty="0" smtClean="0"/>
-              <a:t>Gen2</a:t>
+              <a:t>FILTER V: MOM CAT Gen2</a:t>
             </a:r>
             <a:endParaRPr lang="en-US" dirty="0"/>
           </a:p>
@@ -7510,11 +7599,7 @@
             </a:r>
             <a:r>
               <a:rPr lang="en-US" dirty="0" smtClean="0"/>
-              <a:t>these</a:t>
-            </a:r>
-            <a:r>
-              <a:rPr lang="en-US" dirty="0" smtClean="0"/>
-              <a:t> </a:t>
+              <a:t>these </a:t>
             </a:r>
             <a:r>
               <a:rPr lang="en-US" dirty="0"/>
@@ -7656,7 +7741,15 @@
             </a:r>
             <a:r>
               <a:rPr lang="en-US" sz="2000" dirty="0" smtClean="0"/>
-              <a:t>and write (without quotes) “PD CAT Nightly Test Results”. Press Next.</a:t>
+              <a:t>and </a:t>
+            </a:r>
+            <a:r>
+              <a:rPr lang="en-US" sz="2000" dirty="0" smtClean="0"/>
+              <a:t>add (without </a:t>
+            </a:r>
+            <a:r>
+              <a:rPr lang="en-US" sz="2000" dirty="0" smtClean="0"/>
+              <a:t>quotes) “PD CAT Nightly Test Results”. Press Next.</a:t>
             </a:r>
           </a:p>
           <a:p>

</xml_diff>